<commit_message>
Updated explanatory note and presentation.
</commit_message>
<xml_diff>
--- a/Find mates – WEB app.pptx
+++ b/Find mates – WEB app.pptx
@@ -107,6 +107,11 @@
       </a:defRPr>
     </a:lvl9pPr>
   </p:defaultTextStyle>
+  <p:extLst>
+    <p:ext uri="{EFAFB233-063F-42B5-8137-9DF3F51BA10A}">
+      <p15:sldGuideLst xmlns:p15="http://schemas.microsoft.com/office/powerpoint/2012/main"/>
+    </p:ext>
+  </p:extLst>
 </p:presentation>
 </file>
 
@@ -241,7 +246,7 @@
           <a:p>
             <a:fld id="{43EBF333-A6A1-4506-8BDC-B23E3CBE19CF}" type="datetimeFigureOut">
               <a:rPr lang="ru-RU" smtClean="0"/>
-              <a:t>12.04.2022</a:t>
+              <a:t>13.04.2022</a:t>
             </a:fld>
             <a:endParaRPr lang="ru-RU"/>
           </a:p>
@@ -411,7 +416,7 @@
           <a:p>
             <a:fld id="{43EBF333-A6A1-4506-8BDC-B23E3CBE19CF}" type="datetimeFigureOut">
               <a:rPr lang="ru-RU" smtClean="0"/>
-              <a:t>12.04.2022</a:t>
+              <a:t>13.04.2022</a:t>
             </a:fld>
             <a:endParaRPr lang="ru-RU"/>
           </a:p>
@@ -591,7 +596,7 @@
           <a:p>
             <a:fld id="{43EBF333-A6A1-4506-8BDC-B23E3CBE19CF}" type="datetimeFigureOut">
               <a:rPr lang="ru-RU" smtClean="0"/>
-              <a:t>12.04.2022</a:t>
+              <a:t>13.04.2022</a:t>
             </a:fld>
             <a:endParaRPr lang="ru-RU"/>
           </a:p>
@@ -761,7 +766,7 @@
           <a:p>
             <a:fld id="{43EBF333-A6A1-4506-8BDC-B23E3CBE19CF}" type="datetimeFigureOut">
               <a:rPr lang="ru-RU" smtClean="0"/>
-              <a:t>12.04.2022</a:t>
+              <a:t>13.04.2022</a:t>
             </a:fld>
             <a:endParaRPr lang="ru-RU"/>
           </a:p>
@@ -1007,7 +1012,7 @@
           <a:p>
             <a:fld id="{43EBF333-A6A1-4506-8BDC-B23E3CBE19CF}" type="datetimeFigureOut">
               <a:rPr lang="ru-RU" smtClean="0"/>
-              <a:t>12.04.2022</a:t>
+              <a:t>13.04.2022</a:t>
             </a:fld>
             <a:endParaRPr lang="ru-RU"/>
           </a:p>
@@ -1239,7 +1244,7 @@
           <a:p>
             <a:fld id="{43EBF333-A6A1-4506-8BDC-B23E3CBE19CF}" type="datetimeFigureOut">
               <a:rPr lang="ru-RU" smtClean="0"/>
-              <a:t>12.04.2022</a:t>
+              <a:t>13.04.2022</a:t>
             </a:fld>
             <a:endParaRPr lang="ru-RU"/>
           </a:p>
@@ -1606,7 +1611,7 @@
           <a:p>
             <a:fld id="{43EBF333-A6A1-4506-8BDC-B23E3CBE19CF}" type="datetimeFigureOut">
               <a:rPr lang="ru-RU" smtClean="0"/>
-              <a:t>12.04.2022</a:t>
+              <a:t>13.04.2022</a:t>
             </a:fld>
             <a:endParaRPr lang="ru-RU"/>
           </a:p>
@@ -1724,7 +1729,7 @@
           <a:p>
             <a:fld id="{43EBF333-A6A1-4506-8BDC-B23E3CBE19CF}" type="datetimeFigureOut">
               <a:rPr lang="ru-RU" smtClean="0"/>
-              <a:t>12.04.2022</a:t>
+              <a:t>13.04.2022</a:t>
             </a:fld>
             <a:endParaRPr lang="ru-RU"/>
           </a:p>
@@ -1819,7 +1824,7 @@
           <a:p>
             <a:fld id="{43EBF333-A6A1-4506-8BDC-B23E3CBE19CF}" type="datetimeFigureOut">
               <a:rPr lang="ru-RU" smtClean="0"/>
-              <a:t>12.04.2022</a:t>
+              <a:t>13.04.2022</a:t>
             </a:fld>
             <a:endParaRPr lang="ru-RU"/>
           </a:p>
@@ -2096,7 +2101,7 @@
           <a:p>
             <a:fld id="{43EBF333-A6A1-4506-8BDC-B23E3CBE19CF}" type="datetimeFigureOut">
               <a:rPr lang="ru-RU" smtClean="0"/>
-              <a:t>12.04.2022</a:t>
+              <a:t>13.04.2022</a:t>
             </a:fld>
             <a:endParaRPr lang="ru-RU"/>
           </a:p>
@@ -2349,7 +2354,7 @@
           <a:p>
             <a:fld id="{43EBF333-A6A1-4506-8BDC-B23E3CBE19CF}" type="datetimeFigureOut">
               <a:rPr lang="ru-RU" smtClean="0"/>
-              <a:t>12.04.2022</a:t>
+              <a:t>13.04.2022</a:t>
             </a:fld>
             <a:endParaRPr lang="ru-RU"/>
           </a:p>
@@ -2414,9 +2419,18 @@
 <p:sldMaster xmlns:a="http://schemas.openxmlformats.org/drawingml/2006/main" xmlns:r="http://schemas.openxmlformats.org/officeDocument/2006/relationships" xmlns:p="http://schemas.openxmlformats.org/presentationml/2006/main">
   <p:cSld>
     <p:bg>
-      <p:bgRef idx="1001">
-        <a:schemeClr val="bg1"/>
-      </p:bgRef>
+      <p:bgPr>
+        <a:blipFill dpi="0" rotWithShape="1">
+          <a:blip r:embed="rId13">
+            <a:lum/>
+          </a:blip>
+          <a:srcRect/>
+          <a:stretch>
+            <a:fillRect t="-6000" b="-6000"/>
+          </a:stretch>
+        </a:blipFill>
+        <a:effectLst/>
+      </p:bgPr>
     </p:bg>
     <p:spTree>
       <p:nvGrpSpPr>
@@ -2562,7 +2576,7 @@
           <a:p>
             <a:fld id="{43EBF333-A6A1-4506-8BDC-B23E3CBE19CF}" type="datetimeFigureOut">
               <a:rPr lang="ru-RU" smtClean="0"/>
-              <a:t>12.04.2022</a:t>
+              <a:t>13.04.2022</a:t>
             </a:fld>
             <a:endParaRPr lang="ru-RU"/>
           </a:p>
@@ -3044,14 +3058,6 @@
 <file path=ppt/slides/slide2.xml><?xml version="1.0" encoding="utf-8"?>
 <p:sld xmlns:a="http://schemas.openxmlformats.org/drawingml/2006/main" xmlns:r="http://schemas.openxmlformats.org/officeDocument/2006/relationships" xmlns:p="http://schemas.openxmlformats.org/presentationml/2006/main">
   <p:cSld>
-    <p:bg>
-      <p:bgPr>
-        <a:solidFill>
-          <a:schemeClr val="bg1"/>
-        </a:solidFill>
-        <a:effectLst/>
-      </p:bgPr>
-    </p:bg>
     <p:spTree>
       <p:nvGrpSpPr>
         <p:cNvPr id="1" name=""/>
@@ -3108,54 +3114,6 @@
           </a:p>
         </p:txBody>
       </p:sp>
-      <p:pic>
-        <p:nvPicPr>
-          <p:cNvPr id="4" name="Рисунок 3"/>
-          <p:cNvPicPr>
-            <a:picLocks noChangeAspect="1"/>
-          </p:cNvPicPr>
-          <p:nvPr/>
-        </p:nvPicPr>
-        <p:blipFill>
-          <a:blip r:embed="rId2"/>
-          <a:stretch>
-            <a:fillRect/>
-          </a:stretch>
-        </p:blipFill>
-        <p:spPr>
-          <a:xfrm>
-            <a:off x="838200" y="1825625"/>
-            <a:ext cx="4574907" cy="2403475"/>
-          </a:xfrm>
-          <a:prstGeom prst="rect">
-            <a:avLst/>
-          </a:prstGeom>
-        </p:spPr>
-      </p:pic>
-      <p:pic>
-        <p:nvPicPr>
-          <p:cNvPr id="5" name="Рисунок 4"/>
-          <p:cNvPicPr>
-            <a:picLocks noChangeAspect="1"/>
-          </p:cNvPicPr>
-          <p:nvPr/>
-        </p:nvPicPr>
-        <p:blipFill>
-          <a:blip r:embed="rId3"/>
-          <a:stretch>
-            <a:fillRect/>
-          </a:stretch>
-        </p:blipFill>
-        <p:spPr>
-          <a:xfrm>
-            <a:off x="6519084" y="1825625"/>
-            <a:ext cx="4834716" cy="2546510"/>
-          </a:xfrm>
-          <a:prstGeom prst="rect">
-            <a:avLst/>
-          </a:prstGeom>
-        </p:spPr>
-      </p:pic>
     </p:spTree>
     <p:extLst>
       <p:ext uri="{BB962C8B-B14F-4D97-AF65-F5344CB8AC3E}">
@@ -3235,30 +3193,6 @@
           </a:p>
         </p:txBody>
       </p:sp>
-      <p:pic>
-        <p:nvPicPr>
-          <p:cNvPr id="4" name="Рисунок 3"/>
-          <p:cNvPicPr>
-            <a:picLocks noChangeAspect="1"/>
-          </p:cNvPicPr>
-          <p:nvPr/>
-        </p:nvPicPr>
-        <p:blipFill>
-          <a:blip r:embed="rId2"/>
-          <a:stretch>
-            <a:fillRect/>
-          </a:stretch>
-        </p:blipFill>
-        <p:spPr>
-          <a:xfrm>
-            <a:off x="838199" y="3156290"/>
-            <a:ext cx="10515601" cy="845004"/>
-          </a:xfrm>
-          <a:prstGeom prst="rect">
-            <a:avLst/>
-          </a:prstGeom>
-        </p:spPr>
-      </p:pic>
     </p:spTree>
     <p:extLst>
       <p:ext uri="{BB962C8B-B14F-4D97-AF65-F5344CB8AC3E}">
@@ -3338,78 +3272,6 @@
           </a:p>
         </p:txBody>
       </p:sp>
-      <p:pic>
-        <p:nvPicPr>
-          <p:cNvPr id="4" name="Рисунок 3"/>
-          <p:cNvPicPr>
-            <a:picLocks noChangeAspect="1"/>
-          </p:cNvPicPr>
-          <p:nvPr/>
-        </p:nvPicPr>
-        <p:blipFill>
-          <a:blip r:embed="rId2"/>
-          <a:stretch>
-            <a:fillRect/>
-          </a:stretch>
-        </p:blipFill>
-        <p:spPr>
-          <a:xfrm>
-            <a:off x="3409042" y="2510519"/>
-            <a:ext cx="5373916" cy="2413799"/>
-          </a:xfrm>
-          <a:prstGeom prst="rect">
-            <a:avLst/>
-          </a:prstGeom>
-        </p:spPr>
-      </p:pic>
-      <p:pic>
-        <p:nvPicPr>
-          <p:cNvPr id="5" name="Рисунок 4"/>
-          <p:cNvPicPr>
-            <a:picLocks noChangeAspect="1"/>
-          </p:cNvPicPr>
-          <p:nvPr/>
-        </p:nvPicPr>
-        <p:blipFill>
-          <a:blip r:embed="rId3"/>
-          <a:stretch>
-            <a:fillRect/>
-          </a:stretch>
-        </p:blipFill>
-        <p:spPr>
-          <a:xfrm>
-            <a:off x="838198" y="4142131"/>
-            <a:ext cx="1567543" cy="2034832"/>
-          </a:xfrm>
-          <a:prstGeom prst="rect">
-            <a:avLst/>
-          </a:prstGeom>
-        </p:spPr>
-      </p:pic>
-      <p:pic>
-        <p:nvPicPr>
-          <p:cNvPr id="6" name="Рисунок 5"/>
-          <p:cNvPicPr>
-            <a:picLocks noChangeAspect="1"/>
-          </p:cNvPicPr>
-          <p:nvPr/>
-        </p:nvPicPr>
-        <p:blipFill>
-          <a:blip r:embed="rId4"/>
-          <a:stretch>
-            <a:fillRect/>
-          </a:stretch>
-        </p:blipFill>
-        <p:spPr>
-          <a:xfrm>
-            <a:off x="9409730" y="1690688"/>
-            <a:ext cx="1944070" cy="4392158"/>
-          </a:xfrm>
-          <a:prstGeom prst="rect">
-            <a:avLst/>
-          </a:prstGeom>
-        </p:spPr>
-      </p:pic>
     </p:spTree>
     <p:extLst>
       <p:ext uri="{BB962C8B-B14F-4D97-AF65-F5344CB8AC3E}">

</xml_diff>